<commit_message>
pdf and latest powerpoint
</commit_message>
<xml_diff>
--- a/Stroke/Presentation/Stroke_Prediction_presentation.pptx
+++ b/Stroke/Presentation/Stroke_Prediction_presentation.pptx
@@ -4230,7 +4230,7 @@
               <a:buNone/>
             </a:pPr>
             <a:r>
-              <a:rPr lang="en-US" sz="1800" dirty="0">
+              <a:rPr lang="en-US" sz="2000" dirty="0">
                 <a:effectLst/>
                 <a:ea typeface="Calibri" panose="020F0502020204030204" pitchFamily="34" charset="0"/>
                 <a:cs typeface="Times New Roman" panose="02020603050405020304" pitchFamily="18" charset="0"/>
@@ -4238,7 +4238,7 @@
               <a:t>Cerebrovascular accidents (strokes) in 2020 were the 5</a:t>
             </a:r>
             <a:r>
-              <a:rPr lang="en-US" sz="1800" baseline="30000" dirty="0">
+              <a:rPr lang="en-US" sz="2000" baseline="30000" dirty="0">
                 <a:effectLst/>
                 <a:ea typeface="Calibri" panose="020F0502020204030204" pitchFamily="34" charset="0"/>
                 <a:cs typeface="Times New Roman" panose="02020603050405020304" pitchFamily="18" charset="0"/>
@@ -4246,7 +4246,7 @@
               <a:t>th</a:t>
             </a:r>
             <a:r>
-              <a:rPr lang="en-US" sz="1800" dirty="0">
+              <a:rPr lang="en-US" sz="2000" dirty="0">
                 <a:effectLst/>
                 <a:ea typeface="Calibri" panose="020F0502020204030204" pitchFamily="34" charset="0"/>
                 <a:cs typeface="Times New Roman" panose="02020603050405020304" pitchFamily="18" charset="0"/>
@@ -4254,7 +4254,7 @@
               <a:t> leading cause</a:t>
             </a:r>
             <a:r>
-              <a:rPr lang="en-US" sz="1800" baseline="30000" dirty="0">
+              <a:rPr lang="en-US" sz="2000" baseline="30000" dirty="0">
                 <a:effectLst/>
                 <a:ea typeface="Calibri" panose="020F0502020204030204" pitchFamily="34" charset="0"/>
                 <a:cs typeface="Times New Roman" panose="02020603050405020304" pitchFamily="18" charset="0"/>
@@ -4262,7 +4262,7 @@
               <a:t> </a:t>
             </a:r>
             <a:r>
-              <a:rPr lang="en-US" sz="1800" dirty="0">
+              <a:rPr lang="en-US" sz="2000" dirty="0">
                 <a:effectLst/>
                 <a:ea typeface="Calibri" panose="020F0502020204030204" pitchFamily="34" charset="0"/>
                 <a:cs typeface="Times New Roman" panose="02020603050405020304" pitchFamily="18" charset="0"/>
@@ -4270,7 +4270,7 @@
               <a:t>of </a:t>
             </a:r>
             <a:r>
-              <a:rPr lang="en-US" sz="1800" u="sng" dirty="0">
+              <a:rPr lang="en-US" sz="2000" u="sng" dirty="0">
                 <a:solidFill>
                   <a:srgbClr val="0563C1"/>
                 </a:solidFill>
@@ -4282,7 +4282,7 @@
               <a:t>death</a:t>
             </a:r>
             <a:r>
-              <a:rPr lang="en-US" sz="1800" dirty="0">
+              <a:rPr lang="en-US" sz="2000" dirty="0">
                 <a:effectLst/>
                 <a:ea typeface="Calibri" panose="020F0502020204030204" pitchFamily="34" charset="0"/>
                 <a:cs typeface="Times New Roman" panose="02020603050405020304" pitchFamily="18" charset="0"/>
@@ -4290,7 +4290,7 @@
               <a:t> </a:t>
             </a:r>
             <a:r>
-              <a:rPr lang="en-US" sz="1800" baseline="30000" dirty="0">
+              <a:rPr lang="en-US" sz="2000" baseline="30000" dirty="0">
                 <a:effectLst/>
                 <a:ea typeface="Calibri" panose="020F0502020204030204" pitchFamily="34" charset="0"/>
                 <a:cs typeface="Times New Roman" panose="02020603050405020304" pitchFamily="18" charset="0"/>
@@ -4298,7 +4298,7 @@
               <a:t>[1]</a:t>
             </a:r>
             <a:r>
-              <a:rPr lang="en-US" sz="1800" dirty="0">
+              <a:rPr lang="en-US" sz="2000" dirty="0">
                 <a:effectLst/>
                 <a:ea typeface="Calibri" panose="020F0502020204030204" pitchFamily="34" charset="0"/>
                 <a:cs typeface="Times New Roman" panose="02020603050405020304" pitchFamily="18" charset="0"/>
@@ -4311,15 +4311,43 @@
               <a:buNone/>
             </a:pPr>
             <a:r>
-              <a:rPr lang="en-US" sz="1800" dirty="0">
+              <a:rPr lang="en-US" sz="2000" dirty="0">
                 <a:effectLst/>
                 <a:ea typeface="Calibri" panose="020F0502020204030204" pitchFamily="34" charset="0"/>
                 <a:cs typeface="Times New Roman" panose="02020603050405020304" pitchFamily="18" charset="0"/>
               </a:rPr>
-              <a:t>A stroke occurs when the blood supply to a region of the brain is suddenly blocked or when a rupture occurs starving the brain cells of oxygen and nutrients.  Blockage </a:t>
-            </a:r>
-            <a:r>
-              <a:rPr lang="en-US" sz="1800" dirty="0">
+              <a:t>A stroke occurs when the blood supply to a region of the brain is suddenly stopped </a:t>
+            </a:r>
+            <a:r>
+              <a:rPr lang="en-US" sz="2000" dirty="0">
+                <a:ea typeface="Calibri" panose="020F0502020204030204" pitchFamily="34" charset="0"/>
+                <a:cs typeface="Times New Roman" panose="02020603050405020304" pitchFamily="18" charset="0"/>
+              </a:rPr>
+              <a:t>by either a blockage or </a:t>
+            </a:r>
+            <a:r>
+              <a:rPr lang="en-US" sz="2000" dirty="0">
+                <a:effectLst/>
+                <a:ea typeface="Calibri" panose="020F0502020204030204" pitchFamily="34" charset="0"/>
+                <a:cs typeface="Times New Roman" panose="02020603050405020304" pitchFamily="18" charset="0"/>
+              </a:rPr>
+              <a:t>a rupture.  </a:t>
+            </a:r>
+          </a:p>
+          <a:p>
+            <a:pPr marL="0" indent="0">
+              <a:buNone/>
+            </a:pPr>
+            <a:r>
+              <a:rPr lang="en-US" sz="2000" dirty="0">
+                <a:effectLst/>
+                <a:ea typeface="Calibri" panose="020F0502020204030204" pitchFamily="34" charset="0"/>
+                <a:cs typeface="Times New Roman" panose="02020603050405020304" pitchFamily="18" charset="0"/>
+              </a:rPr>
+              <a:t>Blockage </a:t>
+            </a:r>
+            <a:r>
+              <a:rPr lang="en-US" sz="2000" dirty="0">
                 <a:solidFill>
                   <a:srgbClr val="222328"/>
                 </a:solidFill>
@@ -4327,10 +4355,10 @@
                 <a:ea typeface="Times New Roman" panose="02020603050405020304" pitchFamily="18" charset="0"/>
                 <a:cs typeface="Times New Roman" panose="02020603050405020304" pitchFamily="18" charset="0"/>
               </a:rPr>
-              <a:t>obstructing the flow of blood to a region of the brain is called </a:t>
-            </a:r>
-            <a:r>
-              <a:rPr lang="en-US" sz="1800" dirty="0">
+              <a:t>is </a:t>
+            </a:r>
+            <a:r>
+              <a:rPr lang="en-US" sz="2000" dirty="0">
                 <a:effectLst/>
                 <a:ea typeface="Times New Roman" panose="02020603050405020304" pitchFamily="18" charset="0"/>
                 <a:cs typeface="Times New Roman" panose="02020603050405020304" pitchFamily="18" charset="0"/>
@@ -4338,7 +4366,7 @@
               <a:t>an ischemic stroke and accounts for </a:t>
             </a:r>
             <a:r>
-              <a:rPr lang="en-US" sz="1800" u="sng" dirty="0">
+              <a:rPr lang="en-US" sz="2000" u="sng" dirty="0">
                 <a:solidFill>
                   <a:srgbClr val="0563C1"/>
                 </a:solidFill>
@@ -4350,7 +4378,7 @@
               <a:t>87%</a:t>
             </a:r>
             <a:r>
-              <a:rPr lang="en-US" sz="1800" dirty="0">
+              <a:rPr lang="en-US" sz="2000" dirty="0">
                 <a:effectLst/>
                 <a:ea typeface="Times New Roman" panose="02020603050405020304" pitchFamily="18" charset="0"/>
                 <a:cs typeface="Times New Roman" panose="02020603050405020304" pitchFamily="18" charset="0"/>
@@ -4358,7 +4386,7 @@
               <a:t> </a:t>
             </a:r>
             <a:r>
-              <a:rPr lang="en-US" sz="1800" baseline="30000" dirty="0">
+              <a:rPr lang="en-US" sz="2000" baseline="30000" dirty="0">
                 <a:solidFill>
                   <a:srgbClr val="222328"/>
                 </a:solidFill>
@@ -4369,15 +4397,35 @@
               <a:t>[2] </a:t>
             </a:r>
             <a:r>
-              <a:rPr lang="en-US" sz="1800" dirty="0">
+              <a:rPr lang="en-US" sz="2000" dirty="0">
                 <a:effectLst/>
                 <a:ea typeface="Times New Roman" panose="02020603050405020304" pitchFamily="18" charset="0"/>
                 <a:cs typeface="Times New Roman" panose="02020603050405020304" pitchFamily="18" charset="0"/>
               </a:rPr>
-              <a:t>of all strokes.  The rupturing of a b</a:t>
-            </a:r>
-            <a:r>
-              <a:rPr lang="en-US" sz="1800" dirty="0">
+              <a:t>of all strokes.  </a:t>
+            </a:r>
+          </a:p>
+          <a:p>
+            <a:pPr marL="0" indent="0">
+              <a:buNone/>
+            </a:pPr>
+            <a:r>
+              <a:rPr lang="en-US" sz="2000" dirty="0">
+                <a:ea typeface="Times New Roman" panose="02020603050405020304" pitchFamily="18" charset="0"/>
+                <a:cs typeface="Times New Roman" panose="02020603050405020304" pitchFamily="18" charset="0"/>
+              </a:rPr>
+              <a:t>R</a:t>
+            </a:r>
+            <a:r>
+              <a:rPr lang="en-US" sz="2000" dirty="0">
+                <a:effectLst/>
+                <a:ea typeface="Times New Roman" panose="02020603050405020304" pitchFamily="18" charset="0"/>
+                <a:cs typeface="Times New Roman" panose="02020603050405020304" pitchFamily="18" charset="0"/>
+              </a:rPr>
+              <a:t>upturing of a b</a:t>
+            </a:r>
+            <a:r>
+              <a:rPr lang="en-US" sz="2000" dirty="0">
                 <a:solidFill>
                   <a:srgbClr val="222328"/>
                 </a:solidFill>
@@ -4385,10 +4433,10 @@
                 <a:ea typeface="Times New Roman" panose="02020603050405020304" pitchFamily="18" charset="0"/>
                 <a:cs typeface="Times New Roman" panose="02020603050405020304" pitchFamily="18" charset="0"/>
               </a:rPr>
-              <a:t>lood vessel is called </a:t>
-            </a:r>
-            <a:r>
-              <a:rPr lang="en-US" sz="1800" dirty="0">
+              <a:t>lood vessel is </a:t>
+            </a:r>
+            <a:r>
+              <a:rPr lang="en-US" sz="2000" dirty="0">
                 <a:effectLst/>
                 <a:ea typeface="Times New Roman" panose="02020603050405020304" pitchFamily="18" charset="0"/>
                 <a:cs typeface="Times New Roman" panose="02020603050405020304" pitchFamily="18" charset="0"/>
@@ -4396,7 +4444,7 @@
               <a:t>a hemorrhagic stroke and accounts for </a:t>
             </a:r>
             <a:r>
-              <a:rPr lang="en-US" sz="1800" u="sng" dirty="0">
+              <a:rPr lang="en-US" sz="2000" u="sng" dirty="0">
                 <a:solidFill>
                   <a:srgbClr val="0563C1"/>
                 </a:solidFill>
@@ -4408,7 +4456,7 @@
               <a:t>13%</a:t>
             </a:r>
             <a:r>
-              <a:rPr lang="en-US" sz="1800" dirty="0">
+              <a:rPr lang="en-US" sz="2000" dirty="0">
                 <a:effectLst/>
                 <a:ea typeface="Times New Roman" panose="02020603050405020304" pitchFamily="18" charset="0"/>
                 <a:cs typeface="Times New Roman" panose="02020603050405020304" pitchFamily="18" charset="0"/>
@@ -4416,7 +4464,7 @@
               <a:t> </a:t>
             </a:r>
             <a:r>
-              <a:rPr lang="en-US" sz="1800" baseline="30000" dirty="0">
+              <a:rPr lang="en-US" sz="2000" baseline="30000" dirty="0">
                 <a:solidFill>
                   <a:srgbClr val="222328"/>
                 </a:solidFill>
@@ -4427,14 +4475,14 @@
               <a:t>[3] </a:t>
             </a:r>
             <a:r>
-              <a:rPr lang="en-US" sz="1800" dirty="0">
+              <a:rPr lang="en-US" sz="2000" dirty="0">
                 <a:effectLst/>
                 <a:ea typeface="Times New Roman" panose="02020603050405020304" pitchFamily="18" charset="0"/>
                 <a:cs typeface="Times New Roman" panose="02020603050405020304" pitchFamily="18" charset="0"/>
               </a:rPr>
               <a:t>of all strokes.    </a:t>
             </a:r>
-            <a:endParaRPr lang="en-US" sz="1800" dirty="0">
+            <a:endParaRPr lang="en-US" sz="2000" dirty="0">
               <a:effectLst/>
               <a:ea typeface="Calibri" panose="020F0502020204030204" pitchFamily="34" charset="0"/>
               <a:cs typeface="Times New Roman" panose="02020603050405020304" pitchFamily="18" charset="0"/>
@@ -4976,8 +5024,6 @@
               <a:spcBef>
                 <a:spcPts val="0"/>
               </a:spcBef>
-              <a:buFont typeface="Wingdings" panose="05000000000000000000" pitchFamily="2" charset="2"/>
-              <a:buChar char="§"/>
             </a:pPr>
             <a:r>
               <a:rPr lang="en-US" sz="1800" dirty="0">
@@ -5004,8 +5050,6 @@
               <a:spcBef>
                 <a:spcPts val="0"/>
               </a:spcBef>
-              <a:buFont typeface="Wingdings" panose="05000000000000000000" pitchFamily="2" charset="2"/>
-              <a:buChar char="§"/>
             </a:pPr>
             <a:r>
               <a:rPr lang="en-US" sz="1800" dirty="0">
@@ -5032,8 +5076,6 @@
               <a:spcBef>
                 <a:spcPts val="0"/>
               </a:spcBef>
-              <a:buFont typeface="Wingdings" panose="05000000000000000000" pitchFamily="2" charset="2"/>
-              <a:buChar char="§"/>
             </a:pPr>
             <a:r>
               <a:rPr lang="en-US" sz="1800" dirty="0">
@@ -5060,19 +5102,28 @@
               <a:spcBef>
                 <a:spcPts val="0"/>
               </a:spcBef>
-              <a:buFont typeface="Wingdings" panose="05000000000000000000" pitchFamily="2" charset="2"/>
-              <a:buChar char="§"/>
             </a:pPr>
             <a:r>
               <a:rPr lang="en-US" sz="1800" dirty="0">
                 <a:solidFill>
+                  <a:srgbClr val="FF0000"/>
+                </a:solidFill>
+                <a:effectLst/>
+                <a:ea typeface="Times New Roman" panose="02020603050405020304" pitchFamily="18" charset="0"/>
+                <a:cs typeface="Times New Roman" panose="02020603050405020304" pitchFamily="18" charset="0"/>
+              </a:rPr>
+              <a:t>hypertension</a:t>
+            </a:r>
+            <a:r>
+              <a:rPr lang="en-US" sz="1800" dirty="0">
+                <a:solidFill>
                   <a:srgbClr val="222328"/>
                 </a:solidFill>
                 <a:effectLst/>
                 <a:ea typeface="Times New Roman" panose="02020603050405020304" pitchFamily="18" charset="0"/>
                 <a:cs typeface="Times New Roman" panose="02020603050405020304" pitchFamily="18" charset="0"/>
               </a:rPr>
-              <a:t>hypertension: 0 no hypertension,  1 if hypertension</a:t>
+              <a:t>: 0 no hypertension,  1 if hypertension</a:t>
             </a:r>
             <a:endParaRPr lang="en-US" sz="1800" dirty="0">
               <a:effectLst/>
@@ -5088,13 +5139,11 @@
               <a:spcBef>
                 <a:spcPts val="0"/>
               </a:spcBef>
-              <a:buFont typeface="Wingdings" panose="05000000000000000000" pitchFamily="2" charset="2"/>
-              <a:buChar char="§"/>
             </a:pPr>
             <a:r>
               <a:rPr lang="en-US" sz="1800" dirty="0" err="1">
                 <a:solidFill>
-                  <a:srgbClr val="222328"/>
+                  <a:srgbClr val="FF0000"/>
                 </a:solidFill>
                 <a:effectLst/>
                 <a:ea typeface="Times New Roman" panose="02020603050405020304" pitchFamily="18" charset="0"/>
@@ -5127,8 +5176,6 @@
               <a:spcBef>
                 <a:spcPts val="0"/>
               </a:spcBef>
-              <a:buFont typeface="Wingdings" panose="05000000000000000000" pitchFamily="2" charset="2"/>
-              <a:buChar char="§"/>
             </a:pPr>
             <a:r>
               <a:rPr lang="en-US" sz="1800" dirty="0" err="1">
@@ -5166,8 +5213,6 @@
               <a:spcBef>
                 <a:spcPts val="0"/>
               </a:spcBef>
-              <a:buFont typeface="Wingdings" panose="05000000000000000000" pitchFamily="2" charset="2"/>
-              <a:buChar char="§"/>
             </a:pPr>
             <a:r>
               <a:rPr lang="en-US" sz="1800" dirty="0" err="1">
@@ -5249,8 +5294,6 @@
               <a:spcBef>
                 <a:spcPts val="0"/>
               </a:spcBef>
-              <a:buFont typeface="Wingdings" panose="05000000000000000000" pitchFamily="2" charset="2"/>
-              <a:buChar char="§"/>
             </a:pPr>
             <a:r>
               <a:rPr lang="en-US" sz="1800" dirty="0" err="1">
@@ -5288,13 +5331,11 @@
               <a:spcBef>
                 <a:spcPts val="0"/>
               </a:spcBef>
-              <a:buFont typeface="Wingdings" panose="05000000000000000000" pitchFamily="2" charset="2"/>
-              <a:buChar char="§"/>
             </a:pPr>
             <a:r>
               <a:rPr lang="en-US" sz="1800" dirty="0" err="1">
                 <a:solidFill>
-                  <a:srgbClr val="222328"/>
+                  <a:srgbClr val="FF0000"/>
                 </a:solidFill>
                 <a:effectLst/>
                 <a:ea typeface="Times New Roman" panose="02020603050405020304" pitchFamily="18" charset="0"/>
@@ -5327,13 +5368,11 @@
               <a:spcBef>
                 <a:spcPts val="0"/>
               </a:spcBef>
-              <a:buFont typeface="Wingdings" panose="05000000000000000000" pitchFamily="2" charset="2"/>
-              <a:buChar char="§"/>
             </a:pPr>
             <a:r>
               <a:rPr lang="en-US" sz="1800" dirty="0" err="1">
                 <a:solidFill>
-                  <a:srgbClr val="222328"/>
+                  <a:srgbClr val="FF0000"/>
                 </a:solidFill>
                 <a:effectLst/>
                 <a:ea typeface="Times New Roman" panose="02020603050405020304" pitchFamily="18" charset="0"/>
@@ -5366,13 +5405,11 @@
               <a:spcBef>
                 <a:spcPts val="0"/>
               </a:spcBef>
-              <a:buFont typeface="Wingdings" panose="05000000000000000000" pitchFamily="2" charset="2"/>
-              <a:buChar char="§"/>
             </a:pPr>
             <a:r>
               <a:rPr lang="en-US" sz="1800" dirty="0" err="1">
                 <a:solidFill>
-                  <a:srgbClr val="222328"/>
+                  <a:srgbClr val="FF0000"/>
                 </a:solidFill>
                 <a:effectLst/>
                 <a:ea typeface="Times New Roman" panose="02020603050405020304" pitchFamily="18" charset="0"/>
@@ -5408,8 +5445,6 @@
               <a:spcAft>
                 <a:spcPts val="800"/>
               </a:spcAft>
-              <a:buFont typeface="Wingdings" panose="05000000000000000000" pitchFamily="2" charset="2"/>
-              <a:buChar char="§"/>
             </a:pPr>
             <a:r>
               <a:rPr lang="en-US" sz="1800" dirty="0">
@@ -5635,7 +5670,7 @@
                 <a:ea typeface="Times New Roman" panose="02020603050405020304" pitchFamily="18" charset="0"/>
                 <a:cs typeface="Times New Roman" panose="02020603050405020304" pitchFamily="18" charset="0"/>
               </a:rPr>
-              <a:t>Dataset used for model contained 5109 unique rows. Each row contains patient information designated by a unique id  </a:t>
+              <a:t>Dataset used for model has 5109 unique rows </a:t>
             </a:r>
             <a:endParaRPr lang="en-US" sz="2000" dirty="0">
               <a:effectLst/>
@@ -5652,73 +5687,13 @@
                 <a:effectLst/>
                 <a:ea typeface="Times New Roman" panose="02020603050405020304" pitchFamily="18" charset="0"/>
               </a:rPr>
-              <a:t>2,994 Females</a:t>
-            </a:r>
-          </a:p>
-          <a:p>
-            <a:pPr lvl="1"/>
-            <a:r>
-              <a:rPr lang="en-US" sz="1800" dirty="0">
-                <a:solidFill>
-                  <a:srgbClr val="222328"/>
-                </a:solidFill>
-                <a:ea typeface="Times New Roman" panose="02020603050405020304" pitchFamily="18" charset="0"/>
-              </a:rPr>
-              <a:t>59% of dataset</a:t>
-            </a:r>
-            <a:r>
-              <a:rPr lang="en-US" sz="1800" dirty="0">
-                <a:solidFill>
-                  <a:srgbClr val="222328"/>
-                </a:solidFill>
-                <a:effectLst/>
-                <a:ea typeface="Times New Roman" panose="02020603050405020304" pitchFamily="18" charset="0"/>
-              </a:rPr>
-              <a:t> </a:t>
-            </a:r>
-          </a:p>
-          <a:p>
-            <a:r>
-              <a:rPr lang="en-US" sz="2000" dirty="0">
-                <a:solidFill>
-                  <a:srgbClr val="222328"/>
-                </a:solidFill>
-                <a:effectLst/>
-                <a:ea typeface="Times New Roman" panose="02020603050405020304" pitchFamily="18" charset="0"/>
-              </a:rPr>
-              <a:t>2,115 Males  </a:t>
-            </a:r>
-          </a:p>
-          <a:p>
-            <a:pPr lvl="1"/>
-            <a:r>
-              <a:rPr lang="en-US" sz="1800" dirty="0">
-                <a:solidFill>
-                  <a:srgbClr val="222328"/>
-                </a:solidFill>
-                <a:ea typeface="Times New Roman" panose="02020603050405020304" pitchFamily="18" charset="0"/>
-                <a:cs typeface="Times New Roman" panose="02020603050405020304" pitchFamily="18" charset="0"/>
-              </a:rPr>
-              <a:t>41% of dataset</a:t>
-            </a:r>
-            <a:r>
-              <a:rPr lang="en-US" sz="1800" dirty="0">
-                <a:effectLst/>
-                <a:ea typeface="Times New Roman" panose="02020603050405020304" pitchFamily="18" charset="0"/>
-                <a:cs typeface="Times New Roman" panose="02020603050405020304" pitchFamily="18" charset="0"/>
-              </a:rPr>
-              <a:t>    </a:t>
-            </a:r>
-            <a:endParaRPr lang="en-US" sz="1800" dirty="0">
-              <a:effectLst/>
-              <a:ea typeface="Calibri" panose="020F0502020204030204" pitchFamily="34" charset="0"/>
-              <a:cs typeface="Times New Roman" panose="02020603050405020304" pitchFamily="18" charset="0"/>
-            </a:endParaRPr>
+              <a:t>59% Female, 41% Male  </a:t>
+            </a:r>
           </a:p>
           <a:p>
             <a:r>
               <a:rPr lang="en-US" sz="2000" dirty="0"/>
-              <a:t>4.9% have had a stroke</a:t>
+              <a:t>5% have had a stroke</a:t>
             </a:r>
           </a:p>
           <a:p>
@@ -5726,6 +5701,28 @@
               <a:rPr lang="en-US" sz="2000" dirty="0"/>
               <a:t>92% of strokes occur over age of 50</a:t>
             </a:r>
+          </a:p>
+          <a:p>
+            <a:pPr lvl="1"/>
+            <a:r>
+              <a:rPr lang="en-US" sz="1600" dirty="0"/>
+              <a:t>38% of strokes between 70 – 79</a:t>
+            </a:r>
+          </a:p>
+          <a:p>
+            <a:r>
+              <a:rPr lang="en-US" sz="2000" dirty="0"/>
+              <a:t>Obesity and Current/Former Smoker top 2 comorbidities</a:t>
+            </a:r>
+          </a:p>
+          <a:p>
+            <a:r>
+              <a:rPr lang="en-US" sz="2000" dirty="0"/>
+              <a:t>Occur 86% of stroke victims had comorbidities</a:t>
+            </a:r>
+          </a:p>
+          <a:p>
+            <a:endParaRPr lang="en-US" sz="2000" dirty="0"/>
           </a:p>
           <a:p>
             <a:endParaRPr lang="en-US" dirty="0"/>
@@ -5955,13 +5952,13 @@
         </p:nvSpPr>
         <p:spPr>
           <a:xfrm>
-            <a:off x="6305860" y="1474932"/>
+            <a:off x="6305860" y="1459942"/>
             <a:ext cx="5148184" cy="4513784"/>
           </a:xfrm>
         </p:spPr>
         <p:txBody>
           <a:bodyPr>
-            <a:normAutofit lnSpcReduction="10000"/>
+            <a:normAutofit/>
           </a:bodyPr>
           <a:lstStyle/>
           <a:p>
@@ -5986,13 +5983,8 @@
                 <a:ea typeface="Times New Roman" panose="02020603050405020304" pitchFamily="18" charset="0"/>
                 <a:cs typeface="Times New Roman" panose="02020603050405020304" pitchFamily="18" charset="0"/>
               </a:rPr>
-              <a:t>Basis Risk Factors from American Stroke Association common to the dataset.</a:t>
-            </a:r>
-            <a:endParaRPr lang="en-US" sz="2000" dirty="0">
-              <a:effectLst/>
-              <a:ea typeface="Calibri" panose="020F0502020204030204" pitchFamily="34" charset="0"/>
-              <a:cs typeface="Times New Roman" panose="02020603050405020304" pitchFamily="18" charset="0"/>
-            </a:endParaRPr>
+              <a:t>Risk Factors from American Stroke Association </a:t>
+            </a:r>
           </a:p>
           <a:p>
             <a:pPr marL="800100" lvl="1" indent="-342900">
@@ -6014,13 +6006,19 @@
                 <a:ea typeface="Times New Roman" panose="02020603050405020304" pitchFamily="18" charset="0"/>
                 <a:cs typeface="Times New Roman" panose="02020603050405020304" pitchFamily="18" charset="0"/>
               </a:rPr>
-              <a:t>High Blood Pressure</a:t>
-            </a:r>
-            <a:endParaRPr lang="en-US" sz="2000" dirty="0">
-              <a:effectLst/>
-              <a:ea typeface="Calibri" panose="020F0502020204030204" pitchFamily="34" charset="0"/>
-              <a:cs typeface="Times New Roman" panose="02020603050405020304" pitchFamily="18" charset="0"/>
-            </a:endParaRPr>
+              <a:t>Age </a:t>
+            </a:r>
+            <a:r>
+              <a:rPr lang="en-US" sz="1600" dirty="0">
+                <a:solidFill>
+                  <a:srgbClr val="222328"/>
+                </a:solidFill>
+                <a:effectLst/>
+                <a:ea typeface="Times New Roman" panose="02020603050405020304" pitchFamily="18" charset="0"/>
+                <a:cs typeface="Times New Roman" panose="02020603050405020304" pitchFamily="18" charset="0"/>
+              </a:rPr>
+              <a:t>(cannot be controlled)</a:t>
+            </a:r>
           </a:p>
           <a:p>
             <a:pPr marL="800100" lvl="1" indent="-342900">
@@ -6038,17 +6036,11 @@
                 <a:solidFill>
                   <a:srgbClr val="222328"/>
                 </a:solidFill>
-                <a:effectLst/>
                 <a:ea typeface="Times New Roman" panose="02020603050405020304" pitchFamily="18" charset="0"/>
                 <a:cs typeface="Times New Roman" panose="02020603050405020304" pitchFamily="18" charset="0"/>
               </a:rPr>
-              <a:t>Smoking</a:t>
-            </a:r>
-            <a:endParaRPr lang="en-US" sz="2000" dirty="0">
-              <a:effectLst/>
-              <a:ea typeface="Calibri" panose="020F0502020204030204" pitchFamily="34" charset="0"/>
-              <a:cs typeface="Times New Roman" panose="02020603050405020304" pitchFamily="18" charset="0"/>
-            </a:endParaRPr>
+              <a:t>Heart Disease</a:t>
+            </a:r>
           </a:p>
           <a:p>
             <a:pPr marL="800100" lvl="1" indent="-342900">
@@ -6072,11 +6064,6 @@
               </a:rPr>
               <a:t>Diabetes</a:t>
             </a:r>
-            <a:endParaRPr lang="en-US" sz="2000" dirty="0">
-              <a:effectLst/>
-              <a:ea typeface="Calibri" panose="020F0502020204030204" pitchFamily="34" charset="0"/>
-              <a:cs typeface="Times New Roman" panose="02020603050405020304" pitchFamily="18" charset="0"/>
-            </a:endParaRPr>
           </a:p>
           <a:p>
             <a:pPr marL="800100" lvl="1" indent="-342900">
@@ -6098,13 +6085,8 @@
                 <a:ea typeface="Times New Roman" panose="02020603050405020304" pitchFamily="18" charset="0"/>
                 <a:cs typeface="Times New Roman" panose="02020603050405020304" pitchFamily="18" charset="0"/>
               </a:rPr>
-              <a:t>Obesity</a:t>
-            </a:r>
-            <a:endParaRPr lang="en-US" sz="2000" dirty="0">
-              <a:effectLst/>
-              <a:ea typeface="Calibri" panose="020F0502020204030204" pitchFamily="34" charset="0"/>
-              <a:cs typeface="Times New Roman" panose="02020603050405020304" pitchFamily="18" charset="0"/>
-            </a:endParaRPr>
+              <a:t>High Blood Pressure</a:t>
+            </a:r>
           </a:p>
           <a:p>
             <a:pPr marL="800100" lvl="1" indent="-342900">
@@ -6126,7 +6108,7 @@
                 <a:ea typeface="Times New Roman" panose="02020603050405020304" pitchFamily="18" charset="0"/>
                 <a:cs typeface="Times New Roman" panose="02020603050405020304" pitchFamily="18" charset="0"/>
               </a:rPr>
-              <a:t>Heart Disease </a:t>
+              <a:t>Smoking</a:t>
             </a:r>
             <a:endParaRPr lang="en-US" sz="2000" dirty="0">
               <a:effectLst/>
@@ -6154,7 +6136,7 @@
                 <a:ea typeface="Times New Roman" panose="02020603050405020304" pitchFamily="18" charset="0"/>
                 <a:cs typeface="Times New Roman" panose="02020603050405020304" pitchFamily="18" charset="0"/>
               </a:rPr>
-              <a:t>Age (cannot be controlled)</a:t>
+              <a:t>Obesity</a:t>
             </a:r>
             <a:endParaRPr lang="en-US" sz="2000" dirty="0">
               <a:effectLst/>
@@ -6185,9 +6167,20 @@
                 <a:ea typeface="Times New Roman" panose="02020603050405020304" pitchFamily="18" charset="0"/>
                 <a:cs typeface="Times New Roman" panose="02020603050405020304" pitchFamily="18" charset="0"/>
               </a:rPr>
-              <a:t>Gender (cannot be controlled)</a:t>
-            </a:r>
-            <a:endParaRPr lang="en-US" sz="2000" dirty="0">
+              <a:t>Gender </a:t>
+            </a:r>
+            <a:r>
+              <a:rPr lang="en-US" sz="1600" dirty="0">
+                <a:solidFill>
+                  <a:srgbClr val="222328"/>
+                </a:solidFill>
+                <a:effectLst/>
+                <a:ea typeface="Times New Roman" panose="02020603050405020304" pitchFamily="18" charset="0"/>
+                <a:cs typeface="Times New Roman" panose="02020603050405020304" pitchFamily="18" charset="0"/>
+              </a:rPr>
+              <a:t>(cannot be controlled)</a:t>
+            </a:r>
+            <a:endParaRPr lang="en-US" sz="1600" dirty="0">
               <a:effectLst/>
               <a:ea typeface="Calibri" panose="020F0502020204030204" pitchFamily="34" charset="0"/>
               <a:cs typeface="Times New Roman" panose="02020603050405020304" pitchFamily="18" charset="0"/>
@@ -6338,7 +6331,7 @@
         </p:spPr>
         <p:txBody>
           <a:bodyPr>
-            <a:normAutofit lnSpcReduction="10000"/>
+            <a:normAutofit/>
           </a:bodyPr>
           <a:lstStyle/>
           <a:p>
@@ -6362,7 +6355,53 @@
                 <a:effectLst/>
                 <a:ea typeface="Times New Roman" panose="02020603050405020304" pitchFamily="18" charset="0"/>
               </a:rPr>
-              <a:t>A reliable predictive model can be developed if the data and stroke key attributes are correctly identified and prepared for the machine learning process. </a:t>
+              <a:t>A reliable predictive model can be developed if:</a:t>
+            </a:r>
+          </a:p>
+          <a:p>
+            <a:pPr>
+              <a:lnSpc>
+                <a:spcPct val="107000"/>
+              </a:lnSpc>
+              <a:spcBef>
+                <a:spcPts val="0"/>
+              </a:spcBef>
+              <a:spcAft>
+                <a:spcPts val="800"/>
+              </a:spcAft>
+            </a:pPr>
+            <a:r>
+              <a:rPr lang="en-US" sz="2000" dirty="0">
+                <a:solidFill>
+                  <a:srgbClr val="222328"/>
+                </a:solidFill>
+                <a:effectLst/>
+                <a:ea typeface="Times New Roman" panose="02020603050405020304" pitchFamily="18" charset="0"/>
+              </a:rPr>
+              <a:t>Data and </a:t>
+            </a:r>
+          </a:p>
+          <a:p>
+            <a:pPr>
+              <a:lnSpc>
+                <a:spcPct val="107000"/>
+              </a:lnSpc>
+              <a:spcBef>
+                <a:spcPts val="0"/>
+              </a:spcBef>
+              <a:spcAft>
+                <a:spcPts val="800"/>
+              </a:spcAft>
+            </a:pPr>
+            <a:r>
+              <a:rPr lang="en-US" sz="2000" dirty="0">
+                <a:solidFill>
+                  <a:srgbClr val="222328"/>
+                </a:solidFill>
+                <a:effectLst/>
+                <a:ea typeface="Times New Roman" panose="02020603050405020304" pitchFamily="18" charset="0"/>
+              </a:rPr>
+              <a:t>Key stroke attributes are correctly identified</a:t>
             </a:r>
           </a:p>
           <a:p>
@@ -6386,7 +6425,7 @@
                 <a:effectLst/>
                 <a:ea typeface="Times New Roman" panose="02020603050405020304" pitchFamily="18" charset="0"/>
               </a:rPr>
-              <a:t>The importance of features generated by the model selected will be compared against the stroke risk factors identified by the American Stroke Association.  </a:t>
+              <a:t>Importance features of model will be compared against the risk factors from the American Stroke Association.  </a:t>
             </a:r>
           </a:p>
           <a:p>
@@ -6965,13 +7004,13 @@
         </p:nvSpPr>
         <p:spPr>
           <a:xfrm>
-            <a:off x="6136287" y="1250080"/>
-            <a:ext cx="5148184" cy="4513784"/>
+            <a:off x="6096000" y="1250080"/>
+            <a:ext cx="4965467" cy="4513784"/>
           </a:xfrm>
         </p:spPr>
         <p:txBody>
           <a:bodyPr>
-            <a:normAutofit lnSpcReduction="10000"/>
+            <a:normAutofit/>
           </a:bodyPr>
           <a:lstStyle/>
           <a:p>
@@ -7022,7 +7061,7 @@
                 <a:ea typeface="Times New Roman" panose="02020603050405020304" pitchFamily="18" charset="0"/>
                 <a:cs typeface="Times New Roman" panose="02020603050405020304" pitchFamily="18" charset="0"/>
               </a:rPr>
-              <a:t>The top eleven in the Feature Importance chart:</a:t>
+              <a:t>The top eleven in Feature Importance:</a:t>
             </a:r>
             <a:endParaRPr lang="en-US" sz="2000" dirty="0">
               <a:effectLst/>
@@ -7121,10 +7160,10 @@
                 <a:ea typeface="Times New Roman" panose="02020603050405020304" pitchFamily="18" charset="0"/>
                 <a:cs typeface="Times New Roman" panose="02020603050405020304" pitchFamily="18" charset="0"/>
               </a:rPr>
-              <a:t>Diabetes (</a:t>
-            </a:r>
-            <a:r>
-              <a:rPr lang="en-US" sz="2000" dirty="0" err="1">
+              <a:t>Diabetes </a:t>
+            </a:r>
+            <a:r>
+              <a:rPr lang="en-US" sz="1600" dirty="0">
                 <a:solidFill>
                   <a:srgbClr val="222328"/>
                 </a:solidFill>
@@ -7133,10 +7172,10 @@
                 <a:ea typeface="Times New Roman" panose="02020603050405020304" pitchFamily="18" charset="0"/>
                 <a:cs typeface="Times New Roman" panose="02020603050405020304" pitchFamily="18" charset="0"/>
               </a:rPr>
-              <a:t>avg_glucose_level</a:t>
-            </a:r>
-            <a:r>
-              <a:rPr lang="en-US" sz="2000" dirty="0">
+              <a:t>(</a:t>
+            </a:r>
+            <a:r>
+              <a:rPr lang="en-US" sz="1600" dirty="0" err="1">
                 <a:solidFill>
                   <a:srgbClr val="222328"/>
                 </a:solidFill>
@@ -7145,9 +7184,21 @@
                 <a:ea typeface="Times New Roman" panose="02020603050405020304" pitchFamily="18" charset="0"/>
                 <a:cs typeface="Times New Roman" panose="02020603050405020304" pitchFamily="18" charset="0"/>
               </a:rPr>
+              <a:t>avg_glucose_level</a:t>
+            </a:r>
+            <a:r>
+              <a:rPr lang="en-US" sz="1600" dirty="0">
+                <a:solidFill>
+                  <a:srgbClr val="222328"/>
+                </a:solidFill>
+                <a:effectLst/>
+                <a:latin typeface="Times New Roman" panose="02020603050405020304" pitchFamily="18" charset="0"/>
+                <a:ea typeface="Times New Roman" panose="02020603050405020304" pitchFamily="18" charset="0"/>
+                <a:cs typeface="Times New Roman" panose="02020603050405020304" pitchFamily="18" charset="0"/>
+              </a:rPr>
               <a:t>) </a:t>
             </a:r>
-            <a:endParaRPr lang="en-US" sz="2000" dirty="0">
+            <a:endParaRPr lang="en-US" sz="1600" dirty="0">
               <a:effectLst/>
               <a:latin typeface="Calibri" panose="020F0502020204030204" pitchFamily="34" charset="0"/>
               <a:ea typeface="Calibri" panose="020F0502020204030204" pitchFamily="34" charset="0"/>
@@ -7189,21 +7240,32 @@
                 <a:ea typeface="Times New Roman" panose="02020603050405020304" pitchFamily="18" charset="0"/>
                 <a:cs typeface="Times New Roman" panose="02020603050405020304" pitchFamily="18" charset="0"/>
               </a:rPr>
-              <a:t>lood Pressure (</a:t>
-            </a:r>
-            <a:r>
-              <a:rPr lang="en-US" sz="2000" dirty="0">
+              <a:t>lood Pressure </a:t>
+            </a:r>
+            <a:r>
+              <a:rPr lang="en-US" sz="1600" dirty="0">
                 <a:solidFill>
                   <a:srgbClr val="222328"/>
                 </a:solidFill>
-                <a:effectLst/>
                 <a:latin typeface="Times New Roman" panose="02020603050405020304" pitchFamily="18" charset="0"/>
                 <a:ea typeface="Times New Roman" panose="02020603050405020304" pitchFamily="18" charset="0"/>
                 <a:cs typeface="Times New Roman" panose="02020603050405020304" pitchFamily="18" charset="0"/>
               </a:rPr>
+              <a:t>(</a:t>
+            </a:r>
+            <a:r>
+              <a:rPr lang="en-US" sz="1600" dirty="0">
+                <a:solidFill>
+                  <a:srgbClr val="222328"/>
+                </a:solidFill>
+                <a:effectLst/>
+                <a:latin typeface="Times New Roman" panose="02020603050405020304" pitchFamily="18" charset="0"/>
+                <a:ea typeface="Times New Roman" panose="02020603050405020304" pitchFamily="18" charset="0"/>
+                <a:cs typeface="Times New Roman" panose="02020603050405020304" pitchFamily="18" charset="0"/>
+              </a:rPr>
               <a:t>Hypertension)</a:t>
             </a:r>
-            <a:endParaRPr lang="en-US" sz="2000" dirty="0">
+            <a:endParaRPr lang="en-US" sz="1600" dirty="0">
               <a:effectLst/>
               <a:latin typeface="Calibri" panose="020F0502020204030204" pitchFamily="34" charset="0"/>
               <a:ea typeface="Calibri" panose="020F0502020204030204" pitchFamily="34" charset="0"/>
@@ -7275,10 +7337,10 @@
                 <a:ea typeface="Times New Roman" panose="02020603050405020304" pitchFamily="18" charset="0"/>
                 <a:cs typeface="Times New Roman" panose="02020603050405020304" pitchFamily="18" charset="0"/>
               </a:rPr>
-              <a:t>Smoking (</a:t>
-            </a:r>
-            <a:r>
-              <a:rPr lang="en-US" sz="2000" dirty="0" err="1">
+              <a:t>Smoking </a:t>
+            </a:r>
+            <a:r>
+              <a:rPr lang="en-US" sz="1600" dirty="0">
                 <a:solidFill>
                   <a:srgbClr val="222328"/>
                 </a:solidFill>
@@ -7287,10 +7349,10 @@
                 <a:ea typeface="Times New Roman" panose="02020603050405020304" pitchFamily="18" charset="0"/>
                 <a:cs typeface="Times New Roman" panose="02020603050405020304" pitchFamily="18" charset="0"/>
               </a:rPr>
-              <a:t>smoking_status_former</a:t>
-            </a:r>
-            <a:r>
-              <a:rPr lang="en-US" sz="2000" dirty="0">
+              <a:t>(</a:t>
+            </a:r>
+            <a:r>
+              <a:rPr lang="en-US" sz="1600" dirty="0" err="1">
                 <a:solidFill>
                   <a:srgbClr val="222328"/>
                 </a:solidFill>
@@ -7299,9 +7361,21 @@
                 <a:ea typeface="Times New Roman" panose="02020603050405020304" pitchFamily="18" charset="0"/>
                 <a:cs typeface="Times New Roman" panose="02020603050405020304" pitchFamily="18" charset="0"/>
               </a:rPr>
+              <a:t>smoking_status_former</a:t>
+            </a:r>
+            <a:r>
+              <a:rPr lang="en-US" sz="1600" dirty="0">
+                <a:solidFill>
+                  <a:srgbClr val="222328"/>
+                </a:solidFill>
+                <a:effectLst/>
+                <a:latin typeface="Times New Roman" panose="02020603050405020304" pitchFamily="18" charset="0"/>
+                <a:ea typeface="Times New Roman" panose="02020603050405020304" pitchFamily="18" charset="0"/>
+                <a:cs typeface="Times New Roman" panose="02020603050405020304" pitchFamily="18" charset="0"/>
+              </a:rPr>
               <a:t> &amp; smokes) </a:t>
             </a:r>
-            <a:endParaRPr lang="en-US" sz="2000" dirty="0">
+            <a:endParaRPr lang="en-US" sz="1600" dirty="0">
               <a:effectLst/>
               <a:latin typeface="Calibri" panose="020F0502020204030204" pitchFamily="34" charset="0"/>
               <a:ea typeface="Calibri" panose="020F0502020204030204" pitchFamily="34" charset="0"/>
@@ -7386,10 +7460,10 @@
                 <a:ea typeface="Times New Roman" panose="02020603050405020304" pitchFamily="18" charset="0"/>
                 <a:cs typeface="Times New Roman" panose="02020603050405020304" pitchFamily="18" charset="0"/>
               </a:rPr>
-              <a:t>Obesity (</a:t>
-            </a:r>
-            <a:r>
-              <a:rPr lang="en-US" sz="2000" dirty="0" err="1">
+              <a:t>Obesity </a:t>
+            </a:r>
+            <a:r>
+              <a:rPr lang="en-US" sz="1600" dirty="0">
                 <a:solidFill>
                   <a:srgbClr val="222328"/>
                 </a:solidFill>
@@ -7398,10 +7472,10 @@
                 <a:ea typeface="Times New Roman" panose="02020603050405020304" pitchFamily="18" charset="0"/>
                 <a:cs typeface="Times New Roman" panose="02020603050405020304" pitchFamily="18" charset="0"/>
               </a:rPr>
-              <a:t>bmi</a:t>
-            </a:r>
-            <a:r>
-              <a:rPr lang="en-US" sz="2000" dirty="0">
+              <a:t>(</a:t>
+            </a:r>
+            <a:r>
+              <a:rPr lang="en-US" sz="1600" dirty="0" err="1">
                 <a:solidFill>
                   <a:srgbClr val="222328"/>
                 </a:solidFill>
@@ -7410,9 +7484,21 @@
                 <a:ea typeface="Times New Roman" panose="02020603050405020304" pitchFamily="18" charset="0"/>
                 <a:cs typeface="Times New Roman" panose="02020603050405020304" pitchFamily="18" charset="0"/>
               </a:rPr>
+              <a:t>bmi</a:t>
+            </a:r>
+            <a:r>
+              <a:rPr lang="en-US" sz="1600" dirty="0">
+                <a:solidFill>
+                  <a:srgbClr val="222328"/>
+                </a:solidFill>
+                <a:effectLst/>
+                <a:latin typeface="Times New Roman" panose="02020603050405020304" pitchFamily="18" charset="0"/>
+                <a:ea typeface="Times New Roman" panose="02020603050405020304" pitchFamily="18" charset="0"/>
+                <a:cs typeface="Times New Roman" panose="02020603050405020304" pitchFamily="18" charset="0"/>
+              </a:rPr>
               <a:t>)</a:t>
             </a:r>
-            <a:endParaRPr lang="en-US" sz="2000" dirty="0">
+            <a:endParaRPr lang="en-US" sz="1600" dirty="0">
               <a:effectLst/>
               <a:latin typeface="Calibri" panose="020F0502020204030204" pitchFamily="34" charset="0"/>
               <a:ea typeface="Calibri" panose="020F0502020204030204" pitchFamily="34" charset="0"/>
@@ -7460,7 +7546,7 @@
               <a:buNone/>
             </a:pPr>
             <a:r>
-              <a:rPr lang="en-US" sz="1800" dirty="0">
+              <a:rPr lang="en-US" sz="1600" dirty="0">
                 <a:solidFill>
                   <a:schemeClr val="bg1">
                     <a:lumMod val="50000"/>
@@ -7471,7 +7557,7 @@
               </a:rPr>
               <a:t>(Grayed out attributes are dataset dependencies)</a:t>
             </a:r>
-            <a:endParaRPr lang="en-US" sz="1800" dirty="0">
+            <a:endParaRPr lang="en-US" sz="1600" dirty="0">
               <a:solidFill>
                 <a:schemeClr val="bg1">
                   <a:lumMod val="50000"/>
@@ -7641,16 +7727,16 @@
         <p:spPr>
           <a:xfrm>
             <a:off x="1361296" y="1250080"/>
-            <a:ext cx="4397115" cy="4627808"/>
+            <a:ext cx="4397115" cy="4845920"/>
           </a:xfrm>
         </p:spPr>
         <p:txBody>
           <a:bodyPr>
-            <a:normAutofit lnSpcReduction="10000"/>
+            <a:normAutofit/>
           </a:bodyPr>
           <a:lstStyle/>
           <a:p>
-            <a:pPr marL="0" marR="0" indent="0">
+            <a:pPr marL="0" indent="0">
               <a:lnSpc>
                 <a:spcPct val="107000"/>
               </a:lnSpc>
@@ -7667,26 +7753,11 @@
                 <a:solidFill>
                   <a:srgbClr val="222328"/>
                 </a:solidFill>
-                <a:effectLst/>
                 <a:ea typeface="Times New Roman" panose="02020603050405020304" pitchFamily="18" charset="0"/>
                 <a:cs typeface="Times New Roman" panose="02020603050405020304" pitchFamily="18" charset="0"/>
               </a:rPr>
-              <a:t>Revisit Hypothesis: </a:t>
-            </a:r>
-          </a:p>
-          <a:p>
-            <a:pPr marL="0" marR="0" indent="0">
-              <a:lnSpc>
-                <a:spcPct val="107000"/>
-              </a:lnSpc>
-              <a:spcBef>
-                <a:spcPts val="0"/>
-              </a:spcBef>
-              <a:spcAft>
-                <a:spcPts val="800"/>
-              </a:spcAft>
-              <a:buNone/>
-            </a:pPr>
+              <a:t>Hypothesis Criteria – model importance risk factors match American Stroke Association </a:t>
+            </a:r>
             <a:r>
               <a:rPr lang="en-US" sz="2000" dirty="0">
                 <a:solidFill>
@@ -7696,8 +7767,15 @@
                 <a:ea typeface="Times New Roman" panose="02020603050405020304" pitchFamily="18" charset="0"/>
                 <a:cs typeface="Times New Roman" panose="02020603050405020304" pitchFamily="18" charset="0"/>
               </a:rPr>
-              <a:t>A reliable predictive model can be developed if the data and stroke key attributes are correctly identified and prepared for the machine learning process.  </a:t>
-            </a:r>
+              <a:t> </a:t>
+            </a:r>
+            <a:endParaRPr lang="en-US" sz="2000" dirty="0">
+              <a:solidFill>
+                <a:srgbClr val="222328"/>
+              </a:solidFill>
+              <a:ea typeface="Times New Roman" panose="02020603050405020304" pitchFamily="18" charset="0"/>
+              <a:cs typeface="Times New Roman" panose="02020603050405020304" pitchFamily="18" charset="0"/>
+            </a:endParaRPr>
           </a:p>
           <a:p>
             <a:pPr marL="800100" lvl="1" indent="-342900">
@@ -7719,13 +7797,8 @@
                 <a:ea typeface="Times New Roman" panose="02020603050405020304" pitchFamily="18" charset="0"/>
                 <a:cs typeface="Times New Roman" panose="02020603050405020304" pitchFamily="18" charset="0"/>
               </a:rPr>
-              <a:t>High Blood Pressure</a:t>
-            </a:r>
-            <a:endParaRPr lang="en-US" sz="2000" dirty="0">
-              <a:effectLst/>
-              <a:ea typeface="Calibri" panose="020F0502020204030204" pitchFamily="34" charset="0"/>
-              <a:cs typeface="Times New Roman" panose="02020603050405020304" pitchFamily="18" charset="0"/>
-            </a:endParaRPr>
+              <a:t>Age</a:t>
+            </a:r>
           </a:p>
           <a:p>
             <a:pPr marL="800100" lvl="1" indent="-342900">
@@ -7747,13 +7820,8 @@
                 <a:ea typeface="Times New Roman" panose="02020603050405020304" pitchFamily="18" charset="0"/>
                 <a:cs typeface="Times New Roman" panose="02020603050405020304" pitchFamily="18" charset="0"/>
               </a:rPr>
-              <a:t>Smoking</a:t>
-            </a:r>
-            <a:endParaRPr lang="en-US" sz="2000" dirty="0">
-              <a:effectLst/>
-              <a:ea typeface="Calibri" panose="020F0502020204030204" pitchFamily="34" charset="0"/>
-              <a:cs typeface="Times New Roman" panose="02020603050405020304" pitchFamily="18" charset="0"/>
-            </a:endParaRPr>
+              <a:t>Heart Disease</a:t>
+            </a:r>
           </a:p>
           <a:p>
             <a:pPr marL="800100" lvl="1" indent="-342900">
@@ -7777,11 +7845,6 @@
               </a:rPr>
               <a:t>Diabetes</a:t>
             </a:r>
-            <a:endParaRPr lang="en-US" sz="2000" dirty="0">
-              <a:effectLst/>
-              <a:ea typeface="Calibri" panose="020F0502020204030204" pitchFamily="34" charset="0"/>
-              <a:cs typeface="Times New Roman" panose="02020603050405020304" pitchFamily="18" charset="0"/>
-            </a:endParaRPr>
           </a:p>
           <a:p>
             <a:pPr marL="800100" lvl="1" indent="-342900">
@@ -7803,7 +7866,7 @@
                 <a:ea typeface="Times New Roman" panose="02020603050405020304" pitchFamily="18" charset="0"/>
                 <a:cs typeface="Times New Roman" panose="02020603050405020304" pitchFamily="18" charset="0"/>
               </a:rPr>
-              <a:t>Obesity</a:t>
+              <a:t>High Blood Pressure</a:t>
             </a:r>
             <a:endParaRPr lang="en-US" sz="2000" dirty="0">
               <a:effectLst/>
@@ -7831,7 +7894,7 @@
                 <a:ea typeface="Times New Roman" panose="02020603050405020304" pitchFamily="18" charset="0"/>
                 <a:cs typeface="Times New Roman" panose="02020603050405020304" pitchFamily="18" charset="0"/>
               </a:rPr>
-              <a:t>Heart Disease </a:t>
+              <a:t>Smoking</a:t>
             </a:r>
             <a:endParaRPr lang="en-US" sz="2000" dirty="0">
               <a:effectLst/>
@@ -7859,7 +7922,7 @@
                 <a:ea typeface="Times New Roman" panose="02020603050405020304" pitchFamily="18" charset="0"/>
                 <a:cs typeface="Times New Roman" panose="02020603050405020304" pitchFamily="18" charset="0"/>
               </a:rPr>
-              <a:t>Age (cannot be controlled)</a:t>
+              <a:t>Obesity</a:t>
             </a:r>
             <a:endParaRPr lang="en-US" sz="2000" dirty="0">
               <a:effectLst/>
@@ -7875,9 +7938,6 @@
               <a:spcBef>
                 <a:spcPts val="0"/>
               </a:spcBef>
-              <a:spcAft>
-                <a:spcPts val="800"/>
-              </a:spcAft>
               <a:buFont typeface="Symbol" panose="05050102010706020507" pitchFamily="18" charset="2"/>
               <a:buChar char=""/>
             </a:pPr>
@@ -7890,7 +7950,7 @@
                 <a:ea typeface="Times New Roman" panose="02020603050405020304" pitchFamily="18" charset="0"/>
                 <a:cs typeface="Times New Roman" panose="02020603050405020304" pitchFamily="18" charset="0"/>
               </a:rPr>
-              <a:t>Gender (cannot be controlled)</a:t>
+              <a:t>Gender</a:t>
             </a:r>
             <a:endParaRPr lang="en-US" sz="2000" dirty="0">
               <a:effectLst/>
@@ -8450,7 +8510,7 @@
                 <a:ea typeface="Times New Roman" panose="02020603050405020304" pitchFamily="18" charset="0"/>
                 <a:cs typeface="Times New Roman" panose="02020603050405020304" pitchFamily="18" charset="0"/>
               </a:rPr>
-              <a:t>rograms to stop smoking.</a:t>
+              <a:t>rograms to stop smoking</a:t>
             </a:r>
             <a:endParaRPr lang="en-US" sz="1800" dirty="0">
               <a:effectLst/>

</xml_diff>